<commit_message>
modify demo2 PPT color
</commit_message>
<xml_diff>
--- a/Job Scheduling/assignment/demo2.pptx
+++ b/Job Scheduling/assignment/demo2.pptx
@@ -244,7 +244,7 @@
           <a:p>
             <a:fld id="{63A1C593-65D0-4073-BCC9-577B9352EA97}" type="datetimeFigureOut">
               <a:rPr lang="en-US" smtClean="0"/>
-              <a:t>12/26/18</a:t>
+              <a:t>12/26/2018</a:t>
             </a:fld>
             <a:endParaRPr lang="en-US"/>
           </a:p>
@@ -414,7 +414,7 @@
           <a:p>
             <a:fld id="{63A1C593-65D0-4073-BCC9-577B9352EA97}" type="datetimeFigureOut">
               <a:rPr lang="en-US" smtClean="0"/>
-              <a:t>12/26/18</a:t>
+              <a:t>12/26/2018</a:t>
             </a:fld>
             <a:endParaRPr lang="en-US"/>
           </a:p>
@@ -594,7 +594,7 @@
           <a:p>
             <a:fld id="{63A1C593-65D0-4073-BCC9-577B9352EA97}" type="datetimeFigureOut">
               <a:rPr lang="en-US" smtClean="0"/>
-              <a:t>12/26/18</a:t>
+              <a:t>12/26/2018</a:t>
             </a:fld>
             <a:endParaRPr lang="en-US"/>
           </a:p>
@@ -764,7 +764,7 @@
           <a:p>
             <a:fld id="{63A1C593-65D0-4073-BCC9-577B9352EA97}" type="datetimeFigureOut">
               <a:rPr lang="en-US" smtClean="0"/>
-              <a:t>12/26/18</a:t>
+              <a:t>12/26/2018</a:t>
             </a:fld>
             <a:endParaRPr lang="en-US"/>
           </a:p>
@@ -1010,7 +1010,7 @@
           <a:p>
             <a:fld id="{63A1C593-65D0-4073-BCC9-577B9352EA97}" type="datetimeFigureOut">
               <a:rPr lang="en-US" smtClean="0"/>
-              <a:t>12/26/18</a:t>
+              <a:t>12/26/2018</a:t>
             </a:fld>
             <a:endParaRPr lang="en-US"/>
           </a:p>
@@ -1242,7 +1242,7 @@
           <a:p>
             <a:fld id="{63A1C593-65D0-4073-BCC9-577B9352EA97}" type="datetimeFigureOut">
               <a:rPr lang="en-US" smtClean="0"/>
-              <a:t>12/26/18</a:t>
+              <a:t>12/26/2018</a:t>
             </a:fld>
             <a:endParaRPr lang="en-US"/>
           </a:p>
@@ -1609,7 +1609,7 @@
           <a:p>
             <a:fld id="{63A1C593-65D0-4073-BCC9-577B9352EA97}" type="datetimeFigureOut">
               <a:rPr lang="en-US" smtClean="0"/>
-              <a:t>12/26/18</a:t>
+              <a:t>12/26/2018</a:t>
             </a:fld>
             <a:endParaRPr lang="en-US"/>
           </a:p>
@@ -1727,7 +1727,7 @@
           <a:p>
             <a:fld id="{63A1C593-65D0-4073-BCC9-577B9352EA97}" type="datetimeFigureOut">
               <a:rPr lang="en-US" smtClean="0"/>
-              <a:t>12/26/18</a:t>
+              <a:t>12/26/2018</a:t>
             </a:fld>
             <a:endParaRPr lang="en-US"/>
           </a:p>
@@ -1822,7 +1822,7 @@
           <a:p>
             <a:fld id="{63A1C593-65D0-4073-BCC9-577B9352EA97}" type="datetimeFigureOut">
               <a:rPr lang="en-US" smtClean="0"/>
-              <a:t>12/26/18</a:t>
+              <a:t>12/26/2018</a:t>
             </a:fld>
             <a:endParaRPr lang="en-US"/>
           </a:p>
@@ -2099,7 +2099,7 @@
           <a:p>
             <a:fld id="{63A1C593-65D0-4073-BCC9-577B9352EA97}" type="datetimeFigureOut">
               <a:rPr lang="en-US" smtClean="0"/>
-              <a:t>12/26/18</a:t>
+              <a:t>12/26/2018</a:t>
             </a:fld>
             <a:endParaRPr lang="en-US"/>
           </a:p>
@@ -2352,7 +2352,7 @@
           <a:p>
             <a:fld id="{63A1C593-65D0-4073-BCC9-577B9352EA97}" type="datetimeFigureOut">
               <a:rPr lang="en-US" smtClean="0"/>
-              <a:t>12/26/18</a:t>
+              <a:t>12/26/2018</a:t>
             </a:fld>
             <a:endParaRPr lang="en-US"/>
           </a:p>
@@ -2565,7 +2565,7 @@
           <a:p>
             <a:fld id="{63A1C593-65D0-4073-BCC9-577B9352EA97}" type="datetimeFigureOut">
               <a:rPr lang="en-US" smtClean="0"/>
-              <a:t>12/26/18</a:t>
+              <a:t>12/26/2018</a:t>
             </a:fld>
             <a:endParaRPr lang="en-US"/>
           </a:p>
@@ -2998,21 +2998,21 @@
                 <a:gridCol w="641011">
                   <a:extLst>
                     <a:ext uri="{9D8B030D-6E8A-4147-A177-3AD203B41FA5}">
-                      <a16:colId xmlns="" xmlns:a16="http://schemas.microsoft.com/office/drawing/2014/main" val="1842320837"/>
+                      <a16:colId xmlns:a16="http://schemas.microsoft.com/office/drawing/2014/main" val="1842320837"/>
                     </a:ext>
                   </a:extLst>
                 </a:gridCol>
                 <a:gridCol w="526724">
                   <a:extLst>
                     <a:ext uri="{9D8B030D-6E8A-4147-A177-3AD203B41FA5}">
-                      <a16:colId xmlns="" xmlns:a16="http://schemas.microsoft.com/office/drawing/2014/main" val="2038016994"/>
+                      <a16:colId xmlns:a16="http://schemas.microsoft.com/office/drawing/2014/main" val="2038016994"/>
                     </a:ext>
                   </a:extLst>
                 </a:gridCol>
                 <a:gridCol w="755297">
                   <a:extLst>
                     <a:ext uri="{9D8B030D-6E8A-4147-A177-3AD203B41FA5}">
-                      <a16:colId xmlns="" xmlns:a16="http://schemas.microsoft.com/office/drawing/2014/main" val="3728435139"/>
+                      <a16:colId xmlns:a16="http://schemas.microsoft.com/office/drawing/2014/main" val="3728435139"/>
                     </a:ext>
                   </a:extLst>
                 </a:gridCol>
@@ -3065,7 +3065,7 @@
                 </a:tc>
                 <a:extLst>
                   <a:ext uri="{0D108BD9-81ED-4DB2-BD59-A6C34878D82A}">
-                    <a16:rowId xmlns="" xmlns:a16="http://schemas.microsoft.com/office/drawing/2014/main" val="1025974938"/>
+                    <a16:rowId xmlns:a16="http://schemas.microsoft.com/office/drawing/2014/main" val="1025974938"/>
                   </a:ext>
                 </a:extLst>
               </a:tr>
@@ -3117,7 +3117,7 @@
                 </a:tc>
                 <a:extLst>
                   <a:ext uri="{0D108BD9-81ED-4DB2-BD59-A6C34878D82A}">
-                    <a16:rowId xmlns="" xmlns:a16="http://schemas.microsoft.com/office/drawing/2014/main" val="4077566409"/>
+                    <a16:rowId xmlns:a16="http://schemas.microsoft.com/office/drawing/2014/main" val="4077566409"/>
                   </a:ext>
                 </a:extLst>
               </a:tr>
@@ -3169,7 +3169,7 @@
                 </a:tc>
                 <a:extLst>
                   <a:ext uri="{0D108BD9-81ED-4DB2-BD59-A6C34878D82A}">
-                    <a16:rowId xmlns="" xmlns:a16="http://schemas.microsoft.com/office/drawing/2014/main" val="4214053569"/>
+                    <a16:rowId xmlns:a16="http://schemas.microsoft.com/office/drawing/2014/main" val="4214053569"/>
                   </a:ext>
                 </a:extLst>
               </a:tr>
@@ -3221,7 +3221,7 @@
                 </a:tc>
                 <a:extLst>
                   <a:ext uri="{0D108BD9-81ED-4DB2-BD59-A6C34878D82A}">
-                    <a16:rowId xmlns="" xmlns:a16="http://schemas.microsoft.com/office/drawing/2014/main" val="3475086053"/>
+                    <a16:rowId xmlns:a16="http://schemas.microsoft.com/office/drawing/2014/main" val="3475086053"/>
                   </a:ext>
                 </a:extLst>
               </a:tr>
@@ -3273,7 +3273,7 @@
                 </a:tc>
                 <a:extLst>
                   <a:ext uri="{0D108BD9-81ED-4DB2-BD59-A6C34878D82A}">
-                    <a16:rowId xmlns="" xmlns:a16="http://schemas.microsoft.com/office/drawing/2014/main" val="3245955256"/>
+                    <a16:rowId xmlns:a16="http://schemas.microsoft.com/office/drawing/2014/main" val="3245955256"/>
                   </a:ext>
                 </a:extLst>
               </a:tr>
@@ -3325,7 +3325,7 @@
                 </a:tc>
                 <a:extLst>
                   <a:ext uri="{0D108BD9-81ED-4DB2-BD59-A6C34878D82A}">
-                    <a16:rowId xmlns="" xmlns:a16="http://schemas.microsoft.com/office/drawing/2014/main" val="1233959304"/>
+                    <a16:rowId xmlns:a16="http://schemas.microsoft.com/office/drawing/2014/main" val="1233959304"/>
                   </a:ext>
                 </a:extLst>
               </a:tr>
@@ -3375,6 +3375,11 @@
                   </a:txBody>
                   <a:tcPr/>
                 </a:tc>
+                <a:extLst>
+                  <a:ext uri="{0D108BD9-81ED-4DB2-BD59-A6C34878D82A}">
+                    <a16:rowId xmlns:a16="http://schemas.microsoft.com/office/drawing/2014/main" val="10006"/>
+                  </a:ext>
+                </a:extLst>
               </a:tr>
               <a:tr h="237108">
                 <a:tc>
@@ -3422,6 +3427,11 @@
                   </a:txBody>
                   <a:tcPr/>
                 </a:tc>
+                <a:extLst>
+                  <a:ext uri="{0D108BD9-81ED-4DB2-BD59-A6C34878D82A}">
+                    <a16:rowId xmlns:a16="http://schemas.microsoft.com/office/drawing/2014/main" val="10007"/>
+                  </a:ext>
+                </a:extLst>
               </a:tr>
               <a:tr h="237108">
                 <a:tc>
@@ -3469,6 +3479,11 @@
                   </a:txBody>
                   <a:tcPr/>
                 </a:tc>
+                <a:extLst>
+                  <a:ext uri="{0D108BD9-81ED-4DB2-BD59-A6C34878D82A}">
+                    <a16:rowId xmlns:a16="http://schemas.microsoft.com/office/drawing/2014/main" val="10008"/>
+                  </a:ext>
+                </a:extLst>
               </a:tr>
               <a:tr h="237108">
                 <a:tc>
@@ -3516,6 +3531,11 @@
                   </a:txBody>
                   <a:tcPr/>
                 </a:tc>
+                <a:extLst>
+                  <a:ext uri="{0D108BD9-81ED-4DB2-BD59-A6C34878D82A}">
+                    <a16:rowId xmlns:a16="http://schemas.microsoft.com/office/drawing/2014/main" val="10009"/>
+                  </a:ext>
+                </a:extLst>
               </a:tr>
               <a:tr h="237108">
                 <a:tc>
@@ -3563,6 +3583,11 @@
                   </a:txBody>
                   <a:tcPr/>
                 </a:tc>
+                <a:extLst>
+                  <a:ext uri="{0D108BD9-81ED-4DB2-BD59-A6C34878D82A}">
+                    <a16:rowId xmlns:a16="http://schemas.microsoft.com/office/drawing/2014/main" val="10010"/>
+                  </a:ext>
+                </a:extLst>
               </a:tr>
             </a:tbl>
           </a:graphicData>
@@ -13027,7 +13052,7 @@
             <a:avLst/>
           </a:prstGeom>
           <a:solidFill>
-            <a:schemeClr val="accent2"/>
+            <a:srgbClr val="FF0000"/>
           </a:solidFill>
           <a:ln w="0">
             <a:noFill/>
@@ -13297,21 +13322,21 @@
                 <a:gridCol w="873044">
                   <a:extLst>
                     <a:ext uri="{9D8B030D-6E8A-4147-A177-3AD203B41FA5}">
-                      <a16:colId xmlns="" xmlns:a16="http://schemas.microsoft.com/office/drawing/2014/main" val="1842320837"/>
+                      <a16:colId xmlns:a16="http://schemas.microsoft.com/office/drawing/2014/main" val="1842320837"/>
                     </a:ext>
                   </a:extLst>
                 </a:gridCol>
                 <a:gridCol w="717388">
                   <a:extLst>
                     <a:ext uri="{9D8B030D-6E8A-4147-A177-3AD203B41FA5}">
-                      <a16:colId xmlns="" xmlns:a16="http://schemas.microsoft.com/office/drawing/2014/main" val="2038016994"/>
+                      <a16:colId xmlns:a16="http://schemas.microsoft.com/office/drawing/2014/main" val="2038016994"/>
                     </a:ext>
                   </a:extLst>
                 </a:gridCol>
                 <a:gridCol w="1028699">
                   <a:extLst>
                     <a:ext uri="{9D8B030D-6E8A-4147-A177-3AD203B41FA5}">
-                      <a16:colId xmlns="" xmlns:a16="http://schemas.microsoft.com/office/drawing/2014/main" val="3728435139"/>
+                      <a16:colId xmlns:a16="http://schemas.microsoft.com/office/drawing/2014/main" val="3728435139"/>
                     </a:ext>
                   </a:extLst>
                 </a:gridCol>
@@ -13364,7 +13389,7 @@
                 </a:tc>
                 <a:extLst>
                   <a:ext uri="{0D108BD9-81ED-4DB2-BD59-A6C34878D82A}">
-                    <a16:rowId xmlns="" xmlns:a16="http://schemas.microsoft.com/office/drawing/2014/main" val="1025974938"/>
+                    <a16:rowId xmlns:a16="http://schemas.microsoft.com/office/drawing/2014/main" val="1025974938"/>
                   </a:ext>
                 </a:extLst>
               </a:tr>
@@ -13416,7 +13441,7 @@
                 </a:tc>
                 <a:extLst>
                   <a:ext uri="{0D108BD9-81ED-4DB2-BD59-A6C34878D82A}">
-                    <a16:rowId xmlns="" xmlns:a16="http://schemas.microsoft.com/office/drawing/2014/main" val="4077566409"/>
+                    <a16:rowId xmlns:a16="http://schemas.microsoft.com/office/drawing/2014/main" val="4077566409"/>
                   </a:ext>
                 </a:extLst>
               </a:tr>
@@ -13468,7 +13493,7 @@
                 </a:tc>
                 <a:extLst>
                   <a:ext uri="{0D108BD9-81ED-4DB2-BD59-A6C34878D82A}">
-                    <a16:rowId xmlns="" xmlns:a16="http://schemas.microsoft.com/office/drawing/2014/main" val="4214053569"/>
+                    <a16:rowId xmlns:a16="http://schemas.microsoft.com/office/drawing/2014/main" val="4214053569"/>
                   </a:ext>
                 </a:extLst>
               </a:tr>
@@ -13520,7 +13545,7 @@
                 </a:tc>
                 <a:extLst>
                   <a:ext uri="{0D108BD9-81ED-4DB2-BD59-A6C34878D82A}">
-                    <a16:rowId xmlns="" xmlns:a16="http://schemas.microsoft.com/office/drawing/2014/main" val="3475086053"/>
+                    <a16:rowId xmlns:a16="http://schemas.microsoft.com/office/drawing/2014/main" val="3475086053"/>
                   </a:ext>
                 </a:extLst>
               </a:tr>
@@ -13572,7 +13597,7 @@
                 </a:tc>
                 <a:extLst>
                   <a:ext uri="{0D108BD9-81ED-4DB2-BD59-A6C34878D82A}">
-                    <a16:rowId xmlns="" xmlns:a16="http://schemas.microsoft.com/office/drawing/2014/main" val="3245955256"/>
+                    <a16:rowId xmlns:a16="http://schemas.microsoft.com/office/drawing/2014/main" val="3245955256"/>
                   </a:ext>
                 </a:extLst>
               </a:tr>
@@ -13624,7 +13649,7 @@
                 </a:tc>
                 <a:extLst>
                   <a:ext uri="{0D108BD9-81ED-4DB2-BD59-A6C34878D82A}">
-                    <a16:rowId xmlns="" xmlns:a16="http://schemas.microsoft.com/office/drawing/2014/main" val="1233959304"/>
+                    <a16:rowId xmlns:a16="http://schemas.microsoft.com/office/drawing/2014/main" val="1233959304"/>
                   </a:ext>
                 </a:extLst>
               </a:tr>

</xml_diff>

<commit_message>
add demo screenshot and version1 back up compress
</commit_message>
<xml_diff>
--- a/Job Scheduling/assignment/demo2.pptx
+++ b/Job Scheduling/assignment/demo2.pptx
@@ -244,7 +244,7 @@
           <a:p>
             <a:fld id="{63A1C593-65D0-4073-BCC9-577B9352EA97}" type="datetimeFigureOut">
               <a:rPr lang="en-US" smtClean="0"/>
-              <a:t>12/26/2018</a:t>
+              <a:t>12/26/18</a:t>
             </a:fld>
             <a:endParaRPr lang="en-US"/>
           </a:p>
@@ -414,7 +414,7 @@
           <a:p>
             <a:fld id="{63A1C593-65D0-4073-BCC9-577B9352EA97}" type="datetimeFigureOut">
               <a:rPr lang="en-US" smtClean="0"/>
-              <a:t>12/26/2018</a:t>
+              <a:t>12/26/18</a:t>
             </a:fld>
             <a:endParaRPr lang="en-US"/>
           </a:p>
@@ -594,7 +594,7 @@
           <a:p>
             <a:fld id="{63A1C593-65D0-4073-BCC9-577B9352EA97}" type="datetimeFigureOut">
               <a:rPr lang="en-US" smtClean="0"/>
-              <a:t>12/26/2018</a:t>
+              <a:t>12/26/18</a:t>
             </a:fld>
             <a:endParaRPr lang="en-US"/>
           </a:p>
@@ -764,7 +764,7 @@
           <a:p>
             <a:fld id="{63A1C593-65D0-4073-BCC9-577B9352EA97}" type="datetimeFigureOut">
               <a:rPr lang="en-US" smtClean="0"/>
-              <a:t>12/26/2018</a:t>
+              <a:t>12/26/18</a:t>
             </a:fld>
             <a:endParaRPr lang="en-US"/>
           </a:p>
@@ -1010,7 +1010,7 @@
           <a:p>
             <a:fld id="{63A1C593-65D0-4073-BCC9-577B9352EA97}" type="datetimeFigureOut">
               <a:rPr lang="en-US" smtClean="0"/>
-              <a:t>12/26/2018</a:t>
+              <a:t>12/26/18</a:t>
             </a:fld>
             <a:endParaRPr lang="en-US"/>
           </a:p>
@@ -1242,7 +1242,7 @@
           <a:p>
             <a:fld id="{63A1C593-65D0-4073-BCC9-577B9352EA97}" type="datetimeFigureOut">
               <a:rPr lang="en-US" smtClean="0"/>
-              <a:t>12/26/2018</a:t>
+              <a:t>12/26/18</a:t>
             </a:fld>
             <a:endParaRPr lang="en-US"/>
           </a:p>
@@ -1609,7 +1609,7 @@
           <a:p>
             <a:fld id="{63A1C593-65D0-4073-BCC9-577B9352EA97}" type="datetimeFigureOut">
               <a:rPr lang="en-US" smtClean="0"/>
-              <a:t>12/26/2018</a:t>
+              <a:t>12/26/18</a:t>
             </a:fld>
             <a:endParaRPr lang="en-US"/>
           </a:p>
@@ -1727,7 +1727,7 @@
           <a:p>
             <a:fld id="{63A1C593-65D0-4073-BCC9-577B9352EA97}" type="datetimeFigureOut">
               <a:rPr lang="en-US" smtClean="0"/>
-              <a:t>12/26/2018</a:t>
+              <a:t>12/26/18</a:t>
             </a:fld>
             <a:endParaRPr lang="en-US"/>
           </a:p>
@@ -1822,7 +1822,7 @@
           <a:p>
             <a:fld id="{63A1C593-65D0-4073-BCC9-577B9352EA97}" type="datetimeFigureOut">
               <a:rPr lang="en-US" smtClean="0"/>
-              <a:t>12/26/2018</a:t>
+              <a:t>12/26/18</a:t>
             </a:fld>
             <a:endParaRPr lang="en-US"/>
           </a:p>
@@ -2099,7 +2099,7 @@
           <a:p>
             <a:fld id="{63A1C593-65D0-4073-BCC9-577B9352EA97}" type="datetimeFigureOut">
               <a:rPr lang="en-US" smtClean="0"/>
-              <a:t>12/26/2018</a:t>
+              <a:t>12/26/18</a:t>
             </a:fld>
             <a:endParaRPr lang="en-US"/>
           </a:p>
@@ -2352,7 +2352,7 @@
           <a:p>
             <a:fld id="{63A1C593-65D0-4073-BCC9-577B9352EA97}" type="datetimeFigureOut">
               <a:rPr lang="en-US" smtClean="0"/>
-              <a:t>12/26/2018</a:t>
+              <a:t>12/26/18</a:t>
             </a:fld>
             <a:endParaRPr lang="en-US"/>
           </a:p>
@@ -2565,7 +2565,7 @@
           <a:p>
             <a:fld id="{63A1C593-65D0-4073-BCC9-577B9352EA97}" type="datetimeFigureOut">
               <a:rPr lang="en-US" smtClean="0"/>
-              <a:t>12/26/2018</a:t>
+              <a:t>12/26/18</a:t>
             </a:fld>
             <a:endParaRPr lang="en-US"/>
           </a:p>
@@ -2998,21 +2998,21 @@
                 <a:gridCol w="641011">
                   <a:extLst>
                     <a:ext uri="{9D8B030D-6E8A-4147-A177-3AD203B41FA5}">
-                      <a16:colId xmlns:a16="http://schemas.microsoft.com/office/drawing/2014/main" val="1842320837"/>
+                      <a16:colId xmlns:a16="http://schemas.microsoft.com/office/drawing/2014/main" xmlns="" val="1842320837"/>
                     </a:ext>
                   </a:extLst>
                 </a:gridCol>
                 <a:gridCol w="526724">
                   <a:extLst>
                     <a:ext uri="{9D8B030D-6E8A-4147-A177-3AD203B41FA5}">
-                      <a16:colId xmlns:a16="http://schemas.microsoft.com/office/drawing/2014/main" val="2038016994"/>
+                      <a16:colId xmlns:a16="http://schemas.microsoft.com/office/drawing/2014/main" xmlns="" val="2038016994"/>
                     </a:ext>
                   </a:extLst>
                 </a:gridCol>
                 <a:gridCol w="755297">
                   <a:extLst>
                     <a:ext uri="{9D8B030D-6E8A-4147-A177-3AD203B41FA5}">
-                      <a16:colId xmlns:a16="http://schemas.microsoft.com/office/drawing/2014/main" val="3728435139"/>
+                      <a16:colId xmlns:a16="http://schemas.microsoft.com/office/drawing/2014/main" xmlns="" val="3728435139"/>
                     </a:ext>
                   </a:extLst>
                 </a:gridCol>
@@ -3065,7 +3065,7 @@
                 </a:tc>
                 <a:extLst>
                   <a:ext uri="{0D108BD9-81ED-4DB2-BD59-A6C34878D82A}">
-                    <a16:rowId xmlns:a16="http://schemas.microsoft.com/office/drawing/2014/main" val="1025974938"/>
+                    <a16:rowId xmlns:a16="http://schemas.microsoft.com/office/drawing/2014/main" xmlns="" val="1025974938"/>
                   </a:ext>
                 </a:extLst>
               </a:tr>
@@ -3117,7 +3117,7 @@
                 </a:tc>
                 <a:extLst>
                   <a:ext uri="{0D108BD9-81ED-4DB2-BD59-A6C34878D82A}">
-                    <a16:rowId xmlns:a16="http://schemas.microsoft.com/office/drawing/2014/main" val="4077566409"/>
+                    <a16:rowId xmlns:a16="http://schemas.microsoft.com/office/drawing/2014/main" xmlns="" val="4077566409"/>
                   </a:ext>
                 </a:extLst>
               </a:tr>
@@ -3169,7 +3169,7 @@
                 </a:tc>
                 <a:extLst>
                   <a:ext uri="{0D108BD9-81ED-4DB2-BD59-A6C34878D82A}">
-                    <a16:rowId xmlns:a16="http://schemas.microsoft.com/office/drawing/2014/main" val="4214053569"/>
+                    <a16:rowId xmlns:a16="http://schemas.microsoft.com/office/drawing/2014/main" xmlns="" val="4214053569"/>
                   </a:ext>
                 </a:extLst>
               </a:tr>
@@ -3221,7 +3221,7 @@
                 </a:tc>
                 <a:extLst>
                   <a:ext uri="{0D108BD9-81ED-4DB2-BD59-A6C34878D82A}">
-                    <a16:rowId xmlns:a16="http://schemas.microsoft.com/office/drawing/2014/main" val="3475086053"/>
+                    <a16:rowId xmlns:a16="http://schemas.microsoft.com/office/drawing/2014/main" xmlns="" val="3475086053"/>
                   </a:ext>
                 </a:extLst>
               </a:tr>
@@ -3273,7 +3273,7 @@
                 </a:tc>
                 <a:extLst>
                   <a:ext uri="{0D108BD9-81ED-4DB2-BD59-A6C34878D82A}">
-                    <a16:rowId xmlns:a16="http://schemas.microsoft.com/office/drawing/2014/main" val="3245955256"/>
+                    <a16:rowId xmlns:a16="http://schemas.microsoft.com/office/drawing/2014/main" xmlns="" val="3245955256"/>
                   </a:ext>
                 </a:extLst>
               </a:tr>
@@ -3325,7 +3325,7 @@
                 </a:tc>
                 <a:extLst>
                   <a:ext uri="{0D108BD9-81ED-4DB2-BD59-A6C34878D82A}">
-                    <a16:rowId xmlns:a16="http://schemas.microsoft.com/office/drawing/2014/main" val="1233959304"/>
+                    <a16:rowId xmlns:a16="http://schemas.microsoft.com/office/drawing/2014/main" xmlns="" val="1233959304"/>
                   </a:ext>
                 </a:extLst>
               </a:tr>
@@ -3377,7 +3377,7 @@
                 </a:tc>
                 <a:extLst>
                   <a:ext uri="{0D108BD9-81ED-4DB2-BD59-A6C34878D82A}">
-                    <a16:rowId xmlns:a16="http://schemas.microsoft.com/office/drawing/2014/main" val="10006"/>
+                    <a16:rowId xmlns:a16="http://schemas.microsoft.com/office/drawing/2014/main" xmlns="" val="10006"/>
                   </a:ext>
                 </a:extLst>
               </a:tr>
@@ -3429,7 +3429,7 @@
                 </a:tc>
                 <a:extLst>
                   <a:ext uri="{0D108BD9-81ED-4DB2-BD59-A6C34878D82A}">
-                    <a16:rowId xmlns:a16="http://schemas.microsoft.com/office/drawing/2014/main" val="10007"/>
+                    <a16:rowId xmlns:a16="http://schemas.microsoft.com/office/drawing/2014/main" xmlns="" val="10007"/>
                   </a:ext>
                 </a:extLst>
               </a:tr>
@@ -3481,7 +3481,7 @@
                 </a:tc>
                 <a:extLst>
                   <a:ext uri="{0D108BD9-81ED-4DB2-BD59-A6C34878D82A}">
-                    <a16:rowId xmlns:a16="http://schemas.microsoft.com/office/drawing/2014/main" val="10008"/>
+                    <a16:rowId xmlns:a16="http://schemas.microsoft.com/office/drawing/2014/main" xmlns="" val="10008"/>
                   </a:ext>
                 </a:extLst>
               </a:tr>
@@ -3533,7 +3533,7 @@
                 </a:tc>
                 <a:extLst>
                   <a:ext uri="{0D108BD9-81ED-4DB2-BD59-A6C34878D82A}">
-                    <a16:rowId xmlns:a16="http://schemas.microsoft.com/office/drawing/2014/main" val="10009"/>
+                    <a16:rowId xmlns:a16="http://schemas.microsoft.com/office/drawing/2014/main" xmlns="" val="10009"/>
                   </a:ext>
                 </a:extLst>
               </a:tr>
@@ -3585,7 +3585,7 @@
                 </a:tc>
                 <a:extLst>
                   <a:ext uri="{0D108BD9-81ED-4DB2-BD59-A6C34878D82A}">
-                    <a16:rowId xmlns:a16="http://schemas.microsoft.com/office/drawing/2014/main" val="10010"/>
+                    <a16:rowId xmlns:a16="http://schemas.microsoft.com/office/drawing/2014/main" xmlns="" val="10010"/>
                   </a:ext>
                 </a:extLst>
               </a:tr>
@@ -13046,6 +13046,1766 @@
         <p:spPr>
           <a:xfrm>
             <a:off x="6753933" y="1438942"/>
+            <a:ext cx="218180" cy="213898"/>
+          </a:xfrm>
+          <a:prstGeom prst="mathMultiply">
+            <a:avLst/>
+          </a:prstGeom>
+          <a:solidFill>
+            <a:srgbClr val="FF0000"/>
+          </a:solidFill>
+          <a:ln w="0">
+            <a:noFill/>
+          </a:ln>
+          <a:effectLst>
+            <a:reflection stA="45000" endPos="0" dist="50800" dir="5400000" sy="-100000" algn="bl" rotWithShape="0"/>
+          </a:effectLst>
+        </p:spPr>
+        <p:style>
+          <a:lnRef idx="2">
+            <a:schemeClr val="accent1">
+              <a:shade val="50000"/>
+            </a:schemeClr>
+          </a:lnRef>
+          <a:fillRef idx="1">
+            <a:schemeClr val="accent1"/>
+          </a:fillRef>
+          <a:effectRef idx="0">
+            <a:schemeClr val="accent1"/>
+          </a:effectRef>
+          <a:fontRef idx="minor">
+            <a:schemeClr val="lt1"/>
+          </a:fontRef>
+        </p:style>
+        <p:txBody>
+          <a:bodyPr rtlCol="0" anchor="ctr"/>
+          <a:lstStyle/>
+          <a:p>
+            <a:pPr algn="ctr"/>
+            <a:endParaRPr lang="en-US">
+              <a:solidFill>
+                <a:srgbClr val="FF0000"/>
+              </a:solidFill>
+            </a:endParaRPr>
+          </a:p>
+        </p:txBody>
+      </p:sp>
+      <p:sp>
+        <p:nvSpPr>
+          <p:cNvPr id="166" name="Multiply 165"/>
+          <p:cNvSpPr>
+            <a:spLocks/>
+          </p:cNvSpPr>
+          <p:nvPr/>
+        </p:nvSpPr>
+        <p:spPr>
+          <a:xfrm>
+            <a:off x="7364897" y="1435841"/>
+            <a:ext cx="218180" cy="213898"/>
+          </a:xfrm>
+          <a:prstGeom prst="mathMultiply">
+            <a:avLst/>
+          </a:prstGeom>
+          <a:solidFill>
+            <a:srgbClr val="FF0000"/>
+          </a:solidFill>
+          <a:ln w="0">
+            <a:noFill/>
+          </a:ln>
+          <a:effectLst>
+            <a:reflection stA="45000" endPos="0" dist="50800" dir="5400000" sy="-100000" algn="bl" rotWithShape="0"/>
+          </a:effectLst>
+        </p:spPr>
+        <p:style>
+          <a:lnRef idx="2">
+            <a:schemeClr val="accent1">
+              <a:shade val="50000"/>
+            </a:schemeClr>
+          </a:lnRef>
+          <a:fillRef idx="1">
+            <a:schemeClr val="accent1"/>
+          </a:fillRef>
+          <a:effectRef idx="0">
+            <a:schemeClr val="accent1"/>
+          </a:effectRef>
+          <a:fontRef idx="minor">
+            <a:schemeClr val="lt1"/>
+          </a:fontRef>
+        </p:style>
+        <p:txBody>
+          <a:bodyPr rtlCol="0" anchor="ctr"/>
+          <a:lstStyle/>
+          <a:p>
+            <a:pPr algn="ctr"/>
+            <a:endParaRPr lang="en-US">
+              <a:solidFill>
+                <a:srgbClr val="FF0000"/>
+              </a:solidFill>
+            </a:endParaRPr>
+          </a:p>
+        </p:txBody>
+      </p:sp>
+      <p:sp>
+        <p:nvSpPr>
+          <p:cNvPr id="169" name="Multiply 168"/>
+          <p:cNvSpPr>
+            <a:spLocks/>
+          </p:cNvSpPr>
+          <p:nvPr/>
+        </p:nvSpPr>
+        <p:spPr>
+          <a:xfrm>
+            <a:off x="7957695" y="1415791"/>
+            <a:ext cx="218180" cy="213898"/>
+          </a:xfrm>
+          <a:prstGeom prst="mathMultiply">
+            <a:avLst/>
+          </a:prstGeom>
+          <a:solidFill>
+            <a:srgbClr val="FF0000"/>
+          </a:solidFill>
+          <a:ln w="0">
+            <a:noFill/>
+          </a:ln>
+          <a:effectLst>
+            <a:reflection stA="45000" endPos="0" dist="50800" dir="5400000" sy="-100000" algn="bl" rotWithShape="0"/>
+          </a:effectLst>
+        </p:spPr>
+        <p:style>
+          <a:lnRef idx="2">
+            <a:schemeClr val="accent1">
+              <a:shade val="50000"/>
+            </a:schemeClr>
+          </a:lnRef>
+          <a:fillRef idx="1">
+            <a:schemeClr val="accent1"/>
+          </a:fillRef>
+          <a:effectRef idx="0">
+            <a:schemeClr val="accent1"/>
+          </a:effectRef>
+          <a:fontRef idx="minor">
+            <a:schemeClr val="lt1"/>
+          </a:fontRef>
+        </p:style>
+        <p:txBody>
+          <a:bodyPr rtlCol="0" anchor="ctr"/>
+          <a:lstStyle/>
+          <a:p>
+            <a:pPr algn="ctr"/>
+            <a:endParaRPr lang="en-US">
+              <a:solidFill>
+                <a:srgbClr val="FF0000"/>
+              </a:solidFill>
+            </a:endParaRPr>
+          </a:p>
+        </p:txBody>
+      </p:sp>
+      <p:sp>
+        <p:nvSpPr>
+          <p:cNvPr id="179" name="Multiply 178"/>
+          <p:cNvSpPr>
+            <a:spLocks/>
+          </p:cNvSpPr>
+          <p:nvPr/>
+        </p:nvSpPr>
+        <p:spPr>
+          <a:xfrm>
+            <a:off x="8568053" y="1443143"/>
+            <a:ext cx="218180" cy="213898"/>
+          </a:xfrm>
+          <a:prstGeom prst="mathMultiply">
+            <a:avLst/>
+          </a:prstGeom>
+          <a:solidFill>
+            <a:srgbClr val="FF0000"/>
+          </a:solidFill>
+          <a:ln w="0">
+            <a:noFill/>
+          </a:ln>
+          <a:effectLst>
+            <a:reflection stA="45000" endPos="0" dist="50800" dir="5400000" sy="-100000" algn="bl" rotWithShape="0"/>
+          </a:effectLst>
+        </p:spPr>
+        <p:style>
+          <a:lnRef idx="2">
+            <a:schemeClr val="accent1">
+              <a:shade val="50000"/>
+            </a:schemeClr>
+          </a:lnRef>
+          <a:fillRef idx="1">
+            <a:schemeClr val="accent1"/>
+          </a:fillRef>
+          <a:effectRef idx="0">
+            <a:schemeClr val="accent1"/>
+          </a:effectRef>
+          <a:fontRef idx="minor">
+            <a:schemeClr val="lt1"/>
+          </a:fontRef>
+        </p:style>
+        <p:txBody>
+          <a:bodyPr rtlCol="0" anchor="ctr"/>
+          <a:lstStyle/>
+          <a:p>
+            <a:pPr algn="ctr"/>
+            <a:endParaRPr lang="en-US">
+              <a:solidFill>
+                <a:srgbClr val="FF0000"/>
+              </a:solidFill>
+            </a:endParaRPr>
+          </a:p>
+        </p:txBody>
+      </p:sp>
+      <p:sp>
+        <p:nvSpPr>
+          <p:cNvPr id="180" name="Multiply 179"/>
+          <p:cNvSpPr>
+            <a:spLocks/>
+          </p:cNvSpPr>
+          <p:nvPr/>
+        </p:nvSpPr>
+        <p:spPr>
+          <a:xfrm>
+            <a:off x="9142088" y="1443143"/>
+            <a:ext cx="218180" cy="213898"/>
+          </a:xfrm>
+          <a:prstGeom prst="mathMultiply">
+            <a:avLst/>
+          </a:prstGeom>
+          <a:solidFill>
+            <a:srgbClr val="FF0000"/>
+          </a:solidFill>
+          <a:ln w="0">
+            <a:noFill/>
+          </a:ln>
+          <a:effectLst>
+            <a:reflection stA="45000" endPos="0" dist="50800" dir="5400000" sy="-100000" algn="bl" rotWithShape="0"/>
+          </a:effectLst>
+        </p:spPr>
+        <p:style>
+          <a:lnRef idx="2">
+            <a:schemeClr val="accent1">
+              <a:shade val="50000"/>
+            </a:schemeClr>
+          </a:lnRef>
+          <a:fillRef idx="1">
+            <a:schemeClr val="accent1"/>
+          </a:fillRef>
+          <a:effectRef idx="0">
+            <a:schemeClr val="accent1"/>
+          </a:effectRef>
+          <a:fontRef idx="minor">
+            <a:schemeClr val="lt1"/>
+          </a:fontRef>
+        </p:style>
+        <p:txBody>
+          <a:bodyPr rtlCol="0" anchor="ctr"/>
+          <a:lstStyle/>
+          <a:p>
+            <a:pPr algn="ctr"/>
+            <a:endParaRPr lang="en-US">
+              <a:solidFill>
+                <a:srgbClr val="FF0000"/>
+              </a:solidFill>
+            </a:endParaRPr>
+          </a:p>
+        </p:txBody>
+      </p:sp>
+      <p:sp>
+        <p:nvSpPr>
+          <p:cNvPr id="181" name="Multiply 180"/>
+          <p:cNvSpPr>
+            <a:spLocks/>
+          </p:cNvSpPr>
+          <p:nvPr/>
+        </p:nvSpPr>
+        <p:spPr>
+          <a:xfrm>
+            <a:off x="9748790" y="1443083"/>
+            <a:ext cx="218180" cy="213898"/>
+          </a:xfrm>
+          <a:prstGeom prst="mathMultiply">
+            <a:avLst/>
+          </a:prstGeom>
+          <a:solidFill>
+            <a:srgbClr val="FF0000"/>
+          </a:solidFill>
+          <a:ln w="0">
+            <a:noFill/>
+          </a:ln>
+          <a:effectLst>
+            <a:reflection stA="45000" endPos="0" dist="50800" dir="5400000" sy="-100000" algn="bl" rotWithShape="0"/>
+          </a:effectLst>
+        </p:spPr>
+        <p:style>
+          <a:lnRef idx="2">
+            <a:schemeClr val="accent1">
+              <a:shade val="50000"/>
+            </a:schemeClr>
+          </a:lnRef>
+          <a:fillRef idx="1">
+            <a:schemeClr val="accent1"/>
+          </a:fillRef>
+          <a:effectRef idx="0">
+            <a:schemeClr val="accent1"/>
+          </a:effectRef>
+          <a:fontRef idx="minor">
+            <a:schemeClr val="lt1"/>
+          </a:fontRef>
+        </p:style>
+        <p:txBody>
+          <a:bodyPr rtlCol="0" anchor="ctr"/>
+          <a:lstStyle/>
+          <a:p>
+            <a:pPr algn="ctr"/>
+            <a:endParaRPr lang="en-US">
+              <a:solidFill>
+                <a:srgbClr val="FF0000"/>
+              </a:solidFill>
+            </a:endParaRPr>
+          </a:p>
+        </p:txBody>
+      </p:sp>
+      <p:sp>
+        <p:nvSpPr>
+          <p:cNvPr id="182" name="Multiply 181"/>
+          <p:cNvSpPr>
+            <a:spLocks/>
+          </p:cNvSpPr>
+          <p:nvPr/>
+        </p:nvSpPr>
+        <p:spPr>
+          <a:xfrm>
+            <a:off x="10361650" y="1453146"/>
+            <a:ext cx="218180" cy="213898"/>
+          </a:xfrm>
+          <a:prstGeom prst="mathMultiply">
+            <a:avLst/>
+          </a:prstGeom>
+          <a:solidFill>
+            <a:srgbClr val="FF0000"/>
+          </a:solidFill>
+          <a:ln w="0">
+            <a:noFill/>
+          </a:ln>
+          <a:effectLst>
+            <a:reflection stA="45000" endPos="0" dist="50800" dir="5400000" sy="-100000" algn="bl" rotWithShape="0"/>
+          </a:effectLst>
+        </p:spPr>
+        <p:style>
+          <a:lnRef idx="2">
+            <a:schemeClr val="accent1">
+              <a:shade val="50000"/>
+            </a:schemeClr>
+          </a:lnRef>
+          <a:fillRef idx="1">
+            <a:schemeClr val="accent1"/>
+          </a:fillRef>
+          <a:effectRef idx="0">
+            <a:schemeClr val="accent1"/>
+          </a:effectRef>
+          <a:fontRef idx="minor">
+            <a:schemeClr val="lt1"/>
+          </a:fontRef>
+        </p:style>
+        <p:txBody>
+          <a:bodyPr rtlCol="0" anchor="ctr"/>
+          <a:lstStyle/>
+          <a:p>
+            <a:pPr algn="ctr"/>
+            <a:endParaRPr lang="en-US">
+              <a:solidFill>
+                <a:srgbClr val="FF0000"/>
+              </a:solidFill>
+            </a:endParaRPr>
+          </a:p>
+        </p:txBody>
+      </p:sp>
+      <p:sp>
+        <p:nvSpPr>
+          <p:cNvPr id="183" name="Multiply 182"/>
+          <p:cNvSpPr>
+            <a:spLocks/>
+          </p:cNvSpPr>
+          <p:nvPr/>
+        </p:nvSpPr>
+        <p:spPr>
+          <a:xfrm>
+            <a:off x="10952441" y="1443083"/>
+            <a:ext cx="218180" cy="213898"/>
+          </a:xfrm>
+          <a:prstGeom prst="mathMultiply">
+            <a:avLst/>
+          </a:prstGeom>
+          <a:solidFill>
+            <a:srgbClr val="FF0000"/>
+          </a:solidFill>
+          <a:ln w="0">
+            <a:noFill/>
+          </a:ln>
+          <a:effectLst>
+            <a:reflection stA="45000" endPos="0" dist="50800" dir="5400000" sy="-100000" algn="bl" rotWithShape="0"/>
+          </a:effectLst>
+        </p:spPr>
+        <p:style>
+          <a:lnRef idx="2">
+            <a:schemeClr val="accent1">
+              <a:shade val="50000"/>
+            </a:schemeClr>
+          </a:lnRef>
+          <a:fillRef idx="1">
+            <a:schemeClr val="accent1"/>
+          </a:fillRef>
+          <a:effectRef idx="0">
+            <a:schemeClr val="accent1"/>
+          </a:effectRef>
+          <a:fontRef idx="minor">
+            <a:schemeClr val="lt1"/>
+          </a:fontRef>
+        </p:style>
+        <p:txBody>
+          <a:bodyPr rtlCol="0" anchor="ctr"/>
+          <a:lstStyle/>
+          <a:p>
+            <a:pPr algn="ctr"/>
+            <a:endParaRPr lang="en-US">
+              <a:solidFill>
+                <a:srgbClr val="FF0000"/>
+              </a:solidFill>
+            </a:endParaRPr>
+          </a:p>
+        </p:txBody>
+      </p:sp>
+      <p:sp>
+        <p:nvSpPr>
+          <p:cNvPr id="184" name="Multiply 183"/>
+          <p:cNvSpPr>
+            <a:spLocks/>
+          </p:cNvSpPr>
+          <p:nvPr/>
+        </p:nvSpPr>
+        <p:spPr>
+          <a:xfrm>
+            <a:off x="11580090" y="1446207"/>
+            <a:ext cx="218180" cy="213898"/>
+          </a:xfrm>
+          <a:prstGeom prst="mathMultiply">
+            <a:avLst/>
+          </a:prstGeom>
+          <a:solidFill>
+            <a:srgbClr val="FF0000"/>
+          </a:solidFill>
+          <a:ln w="0">
+            <a:noFill/>
+          </a:ln>
+          <a:effectLst>
+            <a:reflection stA="45000" endPos="0" dist="50800" dir="5400000" sy="-100000" algn="bl" rotWithShape="0"/>
+          </a:effectLst>
+        </p:spPr>
+        <p:style>
+          <a:lnRef idx="2">
+            <a:schemeClr val="accent1">
+              <a:shade val="50000"/>
+            </a:schemeClr>
+          </a:lnRef>
+          <a:fillRef idx="1">
+            <a:schemeClr val="accent1"/>
+          </a:fillRef>
+          <a:effectRef idx="0">
+            <a:schemeClr val="accent1"/>
+          </a:effectRef>
+          <a:fontRef idx="minor">
+            <a:schemeClr val="lt1"/>
+          </a:fontRef>
+        </p:style>
+        <p:txBody>
+          <a:bodyPr rtlCol="0" anchor="ctr"/>
+          <a:lstStyle/>
+          <a:p>
+            <a:pPr algn="ctr"/>
+            <a:endParaRPr lang="en-US">
+              <a:solidFill>
+                <a:srgbClr val="FF0000"/>
+              </a:solidFill>
+            </a:endParaRPr>
+          </a:p>
+        </p:txBody>
+      </p:sp>
+      <p:sp>
+        <p:nvSpPr>
+          <p:cNvPr id="187" name="Multiply 186"/>
+          <p:cNvSpPr>
+            <a:spLocks/>
+          </p:cNvSpPr>
+          <p:nvPr/>
+        </p:nvSpPr>
+        <p:spPr>
+          <a:xfrm>
+            <a:off x="4718343" y="2287941"/>
+            <a:ext cx="218180" cy="213898"/>
+          </a:xfrm>
+          <a:prstGeom prst="mathMultiply">
+            <a:avLst/>
+          </a:prstGeom>
+          <a:solidFill>
+            <a:srgbClr val="FF0000"/>
+          </a:solidFill>
+          <a:ln w="0">
+            <a:noFill/>
+          </a:ln>
+          <a:effectLst>
+            <a:reflection stA="45000" endPos="0" dist="50800" dir="5400000" sy="-100000" algn="bl" rotWithShape="0"/>
+          </a:effectLst>
+        </p:spPr>
+        <p:style>
+          <a:lnRef idx="2">
+            <a:schemeClr val="accent1">
+              <a:shade val="50000"/>
+            </a:schemeClr>
+          </a:lnRef>
+          <a:fillRef idx="1">
+            <a:schemeClr val="accent1"/>
+          </a:fillRef>
+          <a:effectRef idx="0">
+            <a:schemeClr val="accent1"/>
+          </a:effectRef>
+          <a:fontRef idx="minor">
+            <a:schemeClr val="lt1"/>
+          </a:fontRef>
+        </p:style>
+        <p:txBody>
+          <a:bodyPr rtlCol="0" anchor="ctr"/>
+          <a:lstStyle/>
+          <a:p>
+            <a:pPr algn="ctr"/>
+            <a:endParaRPr lang="en-US">
+              <a:solidFill>
+                <a:srgbClr val="FF0000"/>
+              </a:solidFill>
+            </a:endParaRPr>
+          </a:p>
+        </p:txBody>
+      </p:sp>
+      <p:sp>
+        <p:nvSpPr>
+          <p:cNvPr id="188" name="Multiply 187"/>
+          <p:cNvSpPr>
+            <a:spLocks/>
+          </p:cNvSpPr>
+          <p:nvPr/>
+        </p:nvSpPr>
+        <p:spPr>
+          <a:xfrm>
+            <a:off x="5311141" y="2287347"/>
+            <a:ext cx="218180" cy="213898"/>
+          </a:xfrm>
+          <a:prstGeom prst="mathMultiply">
+            <a:avLst/>
+          </a:prstGeom>
+          <a:solidFill>
+            <a:srgbClr val="FF0000"/>
+          </a:solidFill>
+          <a:ln w="0">
+            <a:noFill/>
+          </a:ln>
+          <a:effectLst>
+            <a:reflection stA="45000" endPos="0" dist="50800" dir="5400000" sy="-100000" algn="bl" rotWithShape="0"/>
+          </a:effectLst>
+        </p:spPr>
+        <p:style>
+          <a:lnRef idx="2">
+            <a:schemeClr val="accent1">
+              <a:shade val="50000"/>
+            </a:schemeClr>
+          </a:lnRef>
+          <a:fillRef idx="1">
+            <a:schemeClr val="accent1"/>
+          </a:fillRef>
+          <a:effectRef idx="0">
+            <a:schemeClr val="accent1"/>
+          </a:effectRef>
+          <a:fontRef idx="minor">
+            <a:schemeClr val="lt1"/>
+          </a:fontRef>
+        </p:style>
+        <p:txBody>
+          <a:bodyPr rtlCol="0" anchor="ctr"/>
+          <a:lstStyle/>
+          <a:p>
+            <a:pPr algn="ctr"/>
+            <a:endParaRPr lang="en-US">
+              <a:solidFill>
+                <a:srgbClr val="FF0000"/>
+              </a:solidFill>
+            </a:endParaRPr>
+          </a:p>
+        </p:txBody>
+      </p:sp>
+      <p:sp>
+        <p:nvSpPr>
+          <p:cNvPr id="189" name="Multiply 188"/>
+          <p:cNvSpPr>
+            <a:spLocks/>
+          </p:cNvSpPr>
+          <p:nvPr/>
+        </p:nvSpPr>
+        <p:spPr>
+          <a:xfrm>
+            <a:off x="5921499" y="2295243"/>
+            <a:ext cx="218180" cy="213898"/>
+          </a:xfrm>
+          <a:prstGeom prst="mathMultiply">
+            <a:avLst/>
+          </a:prstGeom>
+          <a:solidFill>
+            <a:srgbClr val="FF0000"/>
+          </a:solidFill>
+          <a:ln w="0">
+            <a:noFill/>
+          </a:ln>
+          <a:effectLst>
+            <a:reflection stA="45000" endPos="0" dist="50800" dir="5400000" sy="-100000" algn="bl" rotWithShape="0"/>
+          </a:effectLst>
+        </p:spPr>
+        <p:style>
+          <a:lnRef idx="2">
+            <a:schemeClr val="accent1">
+              <a:shade val="50000"/>
+            </a:schemeClr>
+          </a:lnRef>
+          <a:fillRef idx="1">
+            <a:schemeClr val="accent1"/>
+          </a:fillRef>
+          <a:effectRef idx="0">
+            <a:schemeClr val="accent1"/>
+          </a:effectRef>
+          <a:fontRef idx="minor">
+            <a:schemeClr val="lt1"/>
+          </a:fontRef>
+        </p:style>
+        <p:txBody>
+          <a:bodyPr rtlCol="0" anchor="ctr"/>
+          <a:lstStyle/>
+          <a:p>
+            <a:pPr algn="ctr"/>
+            <a:endParaRPr lang="en-US">
+              <a:solidFill>
+                <a:srgbClr val="FF0000"/>
+              </a:solidFill>
+            </a:endParaRPr>
+          </a:p>
+        </p:txBody>
+      </p:sp>
+      <p:sp>
+        <p:nvSpPr>
+          <p:cNvPr id="190" name="Multiply 189"/>
+          <p:cNvSpPr>
+            <a:spLocks/>
+          </p:cNvSpPr>
+          <p:nvPr/>
+        </p:nvSpPr>
+        <p:spPr>
+          <a:xfrm>
+            <a:off x="6495534" y="2295243"/>
+            <a:ext cx="218180" cy="213898"/>
+          </a:xfrm>
+          <a:prstGeom prst="mathMultiply">
+            <a:avLst/>
+          </a:prstGeom>
+          <a:solidFill>
+            <a:srgbClr val="FF0000"/>
+          </a:solidFill>
+          <a:ln w="0">
+            <a:noFill/>
+          </a:ln>
+          <a:effectLst>
+            <a:reflection stA="45000" endPos="0" dist="50800" dir="5400000" sy="-100000" algn="bl" rotWithShape="0"/>
+          </a:effectLst>
+        </p:spPr>
+        <p:style>
+          <a:lnRef idx="2">
+            <a:schemeClr val="accent1">
+              <a:shade val="50000"/>
+            </a:schemeClr>
+          </a:lnRef>
+          <a:fillRef idx="1">
+            <a:schemeClr val="accent1"/>
+          </a:fillRef>
+          <a:effectRef idx="0">
+            <a:schemeClr val="accent1"/>
+          </a:effectRef>
+          <a:fontRef idx="minor">
+            <a:schemeClr val="lt1"/>
+          </a:fontRef>
+        </p:style>
+        <p:txBody>
+          <a:bodyPr rtlCol="0" anchor="ctr"/>
+          <a:lstStyle/>
+          <a:p>
+            <a:pPr algn="ctr"/>
+            <a:endParaRPr lang="en-US">
+              <a:solidFill>
+                <a:srgbClr val="FF0000"/>
+              </a:solidFill>
+            </a:endParaRPr>
+          </a:p>
+        </p:txBody>
+      </p:sp>
+      <p:sp>
+        <p:nvSpPr>
+          <p:cNvPr id="191" name="Multiply 190"/>
+          <p:cNvSpPr>
+            <a:spLocks/>
+          </p:cNvSpPr>
+          <p:nvPr/>
+        </p:nvSpPr>
+        <p:spPr>
+          <a:xfrm>
+            <a:off x="7102236" y="2295183"/>
+            <a:ext cx="218180" cy="213898"/>
+          </a:xfrm>
+          <a:prstGeom prst="mathMultiply">
+            <a:avLst/>
+          </a:prstGeom>
+          <a:solidFill>
+            <a:srgbClr val="FF0000"/>
+          </a:solidFill>
+          <a:ln w="0">
+            <a:noFill/>
+          </a:ln>
+          <a:effectLst>
+            <a:reflection stA="45000" endPos="0" dist="50800" dir="5400000" sy="-100000" algn="bl" rotWithShape="0"/>
+          </a:effectLst>
+        </p:spPr>
+        <p:style>
+          <a:lnRef idx="2">
+            <a:schemeClr val="accent1">
+              <a:shade val="50000"/>
+            </a:schemeClr>
+          </a:lnRef>
+          <a:fillRef idx="1">
+            <a:schemeClr val="accent1"/>
+          </a:fillRef>
+          <a:effectRef idx="0">
+            <a:schemeClr val="accent1"/>
+          </a:effectRef>
+          <a:fontRef idx="minor">
+            <a:schemeClr val="lt1"/>
+          </a:fontRef>
+        </p:style>
+        <p:txBody>
+          <a:bodyPr rtlCol="0" anchor="ctr"/>
+          <a:lstStyle/>
+          <a:p>
+            <a:pPr algn="ctr"/>
+            <a:endParaRPr lang="en-US">
+              <a:solidFill>
+                <a:srgbClr val="FF0000"/>
+              </a:solidFill>
+            </a:endParaRPr>
+          </a:p>
+        </p:txBody>
+      </p:sp>
+      <p:sp>
+        <p:nvSpPr>
+          <p:cNvPr id="193" name="Multiply 192"/>
+          <p:cNvSpPr>
+            <a:spLocks/>
+          </p:cNvSpPr>
+          <p:nvPr/>
+        </p:nvSpPr>
+        <p:spPr>
+          <a:xfrm>
+            <a:off x="7715096" y="2305246"/>
+            <a:ext cx="218180" cy="213898"/>
+          </a:xfrm>
+          <a:prstGeom prst="mathMultiply">
+            <a:avLst/>
+          </a:prstGeom>
+          <a:solidFill>
+            <a:srgbClr val="FF0000"/>
+          </a:solidFill>
+          <a:ln w="0">
+            <a:noFill/>
+          </a:ln>
+          <a:effectLst>
+            <a:reflection stA="45000" endPos="0" dist="50800" dir="5400000" sy="-100000" algn="bl" rotWithShape="0"/>
+          </a:effectLst>
+        </p:spPr>
+        <p:style>
+          <a:lnRef idx="2">
+            <a:schemeClr val="accent1">
+              <a:shade val="50000"/>
+            </a:schemeClr>
+          </a:lnRef>
+          <a:fillRef idx="1">
+            <a:schemeClr val="accent1"/>
+          </a:fillRef>
+          <a:effectRef idx="0">
+            <a:schemeClr val="accent1"/>
+          </a:effectRef>
+          <a:fontRef idx="minor">
+            <a:schemeClr val="lt1"/>
+          </a:fontRef>
+        </p:style>
+        <p:txBody>
+          <a:bodyPr rtlCol="0" anchor="ctr"/>
+          <a:lstStyle/>
+          <a:p>
+            <a:pPr algn="ctr"/>
+            <a:endParaRPr lang="en-US">
+              <a:solidFill>
+                <a:srgbClr val="FF0000"/>
+              </a:solidFill>
+            </a:endParaRPr>
+          </a:p>
+        </p:txBody>
+      </p:sp>
+      <p:sp>
+        <p:nvSpPr>
+          <p:cNvPr id="194" name="Multiply 193"/>
+          <p:cNvSpPr>
+            <a:spLocks/>
+          </p:cNvSpPr>
+          <p:nvPr/>
+        </p:nvSpPr>
+        <p:spPr>
+          <a:xfrm>
+            <a:off x="8305887" y="2295183"/>
+            <a:ext cx="218180" cy="213898"/>
+          </a:xfrm>
+          <a:prstGeom prst="mathMultiply">
+            <a:avLst/>
+          </a:prstGeom>
+          <a:solidFill>
+            <a:srgbClr val="FF0000"/>
+          </a:solidFill>
+          <a:ln w="0">
+            <a:noFill/>
+          </a:ln>
+          <a:effectLst>
+            <a:reflection stA="45000" endPos="0" dist="50800" dir="5400000" sy="-100000" algn="bl" rotWithShape="0"/>
+          </a:effectLst>
+        </p:spPr>
+        <p:style>
+          <a:lnRef idx="2">
+            <a:schemeClr val="accent1">
+              <a:shade val="50000"/>
+            </a:schemeClr>
+          </a:lnRef>
+          <a:fillRef idx="1">
+            <a:schemeClr val="accent1"/>
+          </a:fillRef>
+          <a:effectRef idx="0">
+            <a:schemeClr val="accent1"/>
+          </a:effectRef>
+          <a:fontRef idx="minor">
+            <a:schemeClr val="lt1"/>
+          </a:fontRef>
+        </p:style>
+        <p:txBody>
+          <a:bodyPr rtlCol="0" anchor="ctr"/>
+          <a:lstStyle/>
+          <a:p>
+            <a:pPr algn="ctr"/>
+            <a:endParaRPr lang="en-US">
+              <a:solidFill>
+                <a:srgbClr val="FF0000"/>
+              </a:solidFill>
+            </a:endParaRPr>
+          </a:p>
+        </p:txBody>
+      </p:sp>
+      <p:sp>
+        <p:nvSpPr>
+          <p:cNvPr id="195" name="Multiply 194"/>
+          <p:cNvSpPr>
+            <a:spLocks/>
+          </p:cNvSpPr>
+          <p:nvPr/>
+        </p:nvSpPr>
+        <p:spPr>
+          <a:xfrm>
+            <a:off x="8933536" y="2298307"/>
+            <a:ext cx="218180" cy="213898"/>
+          </a:xfrm>
+          <a:prstGeom prst="mathMultiply">
+            <a:avLst/>
+          </a:prstGeom>
+          <a:solidFill>
+            <a:srgbClr val="FF0000"/>
+          </a:solidFill>
+          <a:ln w="0">
+            <a:noFill/>
+          </a:ln>
+          <a:effectLst>
+            <a:reflection stA="45000" endPos="0" dist="50800" dir="5400000" sy="-100000" algn="bl" rotWithShape="0"/>
+          </a:effectLst>
+        </p:spPr>
+        <p:style>
+          <a:lnRef idx="2">
+            <a:schemeClr val="accent1">
+              <a:shade val="50000"/>
+            </a:schemeClr>
+          </a:lnRef>
+          <a:fillRef idx="1">
+            <a:schemeClr val="accent1"/>
+          </a:fillRef>
+          <a:effectRef idx="0">
+            <a:schemeClr val="accent1"/>
+          </a:effectRef>
+          <a:fontRef idx="minor">
+            <a:schemeClr val="lt1"/>
+          </a:fontRef>
+        </p:style>
+        <p:txBody>
+          <a:bodyPr rtlCol="0" anchor="ctr"/>
+          <a:lstStyle/>
+          <a:p>
+            <a:pPr algn="ctr"/>
+            <a:endParaRPr lang="en-US">
+              <a:solidFill>
+                <a:srgbClr val="FF0000"/>
+              </a:solidFill>
+            </a:endParaRPr>
+          </a:p>
+        </p:txBody>
+      </p:sp>
+      <p:sp>
+        <p:nvSpPr>
+          <p:cNvPr id="196" name="Multiply 195"/>
+          <p:cNvSpPr>
+            <a:spLocks/>
+          </p:cNvSpPr>
+          <p:nvPr/>
+        </p:nvSpPr>
+        <p:spPr>
+          <a:xfrm>
+            <a:off x="3285403" y="3111163"/>
+            <a:ext cx="218180" cy="213898"/>
+          </a:xfrm>
+          <a:prstGeom prst="mathMultiply">
+            <a:avLst/>
+          </a:prstGeom>
+          <a:solidFill>
+            <a:srgbClr val="FF0000"/>
+          </a:solidFill>
+          <a:ln w="0">
+            <a:noFill/>
+          </a:ln>
+          <a:effectLst>
+            <a:reflection stA="45000" endPos="0" dist="50800" dir="5400000" sy="-100000" algn="bl" rotWithShape="0"/>
+          </a:effectLst>
+        </p:spPr>
+        <p:style>
+          <a:lnRef idx="2">
+            <a:schemeClr val="accent1">
+              <a:shade val="50000"/>
+            </a:schemeClr>
+          </a:lnRef>
+          <a:fillRef idx="1">
+            <a:schemeClr val="accent1"/>
+          </a:fillRef>
+          <a:effectRef idx="0">
+            <a:schemeClr val="accent1"/>
+          </a:effectRef>
+          <a:fontRef idx="minor">
+            <a:schemeClr val="lt1"/>
+          </a:fontRef>
+        </p:style>
+        <p:txBody>
+          <a:bodyPr rtlCol="0" anchor="ctr"/>
+          <a:lstStyle/>
+          <a:p>
+            <a:pPr algn="ctr"/>
+            <a:endParaRPr lang="en-US">
+              <a:solidFill>
+                <a:srgbClr val="FF0000"/>
+              </a:solidFill>
+            </a:endParaRPr>
+          </a:p>
+        </p:txBody>
+      </p:sp>
+      <p:sp>
+        <p:nvSpPr>
+          <p:cNvPr id="197" name="Multiply 196"/>
+          <p:cNvSpPr>
+            <a:spLocks/>
+          </p:cNvSpPr>
+          <p:nvPr/>
+        </p:nvSpPr>
+        <p:spPr>
+          <a:xfrm>
+            <a:off x="3895761" y="3128787"/>
+            <a:ext cx="218180" cy="213898"/>
+          </a:xfrm>
+          <a:prstGeom prst="mathMultiply">
+            <a:avLst/>
+          </a:prstGeom>
+          <a:solidFill>
+            <a:srgbClr val="FF0000"/>
+          </a:solidFill>
+          <a:ln w="0">
+            <a:noFill/>
+          </a:ln>
+          <a:effectLst>
+            <a:reflection stA="45000" endPos="0" dist="50800" dir="5400000" sy="-100000" algn="bl" rotWithShape="0"/>
+          </a:effectLst>
+        </p:spPr>
+        <p:style>
+          <a:lnRef idx="2">
+            <a:schemeClr val="accent1">
+              <a:shade val="50000"/>
+            </a:schemeClr>
+          </a:lnRef>
+          <a:fillRef idx="1">
+            <a:schemeClr val="accent1"/>
+          </a:fillRef>
+          <a:effectRef idx="0">
+            <a:schemeClr val="accent1"/>
+          </a:effectRef>
+          <a:fontRef idx="minor">
+            <a:schemeClr val="lt1"/>
+          </a:fontRef>
+        </p:style>
+        <p:txBody>
+          <a:bodyPr rtlCol="0" anchor="ctr"/>
+          <a:lstStyle/>
+          <a:p>
+            <a:pPr algn="ctr"/>
+            <a:endParaRPr lang="en-US">
+              <a:solidFill>
+                <a:srgbClr val="FF0000"/>
+              </a:solidFill>
+            </a:endParaRPr>
+          </a:p>
+        </p:txBody>
+      </p:sp>
+      <p:sp>
+        <p:nvSpPr>
+          <p:cNvPr id="198" name="Multiply 197"/>
+          <p:cNvSpPr>
+            <a:spLocks/>
+          </p:cNvSpPr>
+          <p:nvPr/>
+        </p:nvSpPr>
+        <p:spPr>
+          <a:xfrm>
+            <a:off x="4489252" y="3128787"/>
+            <a:ext cx="218180" cy="213898"/>
+          </a:xfrm>
+          <a:prstGeom prst="mathMultiply">
+            <a:avLst/>
+          </a:prstGeom>
+          <a:solidFill>
+            <a:srgbClr val="FF0000"/>
+          </a:solidFill>
+          <a:ln w="0">
+            <a:noFill/>
+          </a:ln>
+          <a:effectLst>
+            <a:reflection stA="45000" endPos="0" dist="50800" dir="5400000" sy="-100000" algn="bl" rotWithShape="0"/>
+          </a:effectLst>
+        </p:spPr>
+        <p:style>
+          <a:lnRef idx="2">
+            <a:schemeClr val="accent1">
+              <a:shade val="50000"/>
+            </a:schemeClr>
+          </a:lnRef>
+          <a:fillRef idx="1">
+            <a:schemeClr val="accent1"/>
+          </a:fillRef>
+          <a:effectRef idx="0">
+            <a:schemeClr val="accent1"/>
+          </a:effectRef>
+          <a:fontRef idx="minor">
+            <a:schemeClr val="lt1"/>
+          </a:fontRef>
+        </p:style>
+        <p:txBody>
+          <a:bodyPr rtlCol="0" anchor="ctr"/>
+          <a:lstStyle/>
+          <a:p>
+            <a:pPr algn="ctr"/>
+            <a:endParaRPr lang="en-US">
+              <a:solidFill>
+                <a:srgbClr val="FF0000"/>
+              </a:solidFill>
+            </a:endParaRPr>
+          </a:p>
+        </p:txBody>
+      </p:sp>
+      <p:sp>
+        <p:nvSpPr>
+          <p:cNvPr id="199" name="Multiply 198"/>
+          <p:cNvSpPr>
+            <a:spLocks/>
+          </p:cNvSpPr>
+          <p:nvPr/>
+        </p:nvSpPr>
+        <p:spPr>
+          <a:xfrm>
+            <a:off x="5086226" y="3128727"/>
+            <a:ext cx="218180" cy="213898"/>
+          </a:xfrm>
+          <a:prstGeom prst="mathMultiply">
+            <a:avLst/>
+          </a:prstGeom>
+          <a:solidFill>
+            <a:srgbClr val="FF0000"/>
+          </a:solidFill>
+          <a:ln w="0">
+            <a:noFill/>
+          </a:ln>
+          <a:effectLst>
+            <a:reflection stA="45000" endPos="0" dist="50800" dir="5400000" sy="-100000" algn="bl" rotWithShape="0"/>
+          </a:effectLst>
+        </p:spPr>
+        <p:style>
+          <a:lnRef idx="2">
+            <a:schemeClr val="accent1">
+              <a:shade val="50000"/>
+            </a:schemeClr>
+          </a:lnRef>
+          <a:fillRef idx="1">
+            <a:schemeClr val="accent1"/>
+          </a:fillRef>
+          <a:effectRef idx="0">
+            <a:schemeClr val="accent1"/>
+          </a:effectRef>
+          <a:fontRef idx="minor">
+            <a:schemeClr val="lt1"/>
+          </a:fontRef>
+        </p:style>
+        <p:txBody>
+          <a:bodyPr rtlCol="0" anchor="ctr"/>
+          <a:lstStyle/>
+          <a:p>
+            <a:pPr algn="ctr"/>
+            <a:endParaRPr lang="en-US">
+              <a:solidFill>
+                <a:srgbClr val="FF0000"/>
+              </a:solidFill>
+            </a:endParaRPr>
+          </a:p>
+        </p:txBody>
+      </p:sp>
+      <p:sp>
+        <p:nvSpPr>
+          <p:cNvPr id="200" name="Multiply 199"/>
+          <p:cNvSpPr>
+            <a:spLocks/>
+          </p:cNvSpPr>
+          <p:nvPr/>
+        </p:nvSpPr>
+        <p:spPr>
+          <a:xfrm>
+            <a:off x="5679630" y="3138790"/>
+            <a:ext cx="218180" cy="213898"/>
+          </a:xfrm>
+          <a:prstGeom prst="mathMultiply">
+            <a:avLst/>
+          </a:prstGeom>
+          <a:solidFill>
+            <a:srgbClr val="FF0000"/>
+          </a:solidFill>
+          <a:ln w="0">
+            <a:noFill/>
+          </a:ln>
+          <a:effectLst>
+            <a:reflection stA="45000" endPos="0" dist="50800" dir="5400000" sy="-100000" algn="bl" rotWithShape="0"/>
+          </a:effectLst>
+        </p:spPr>
+        <p:style>
+          <a:lnRef idx="2">
+            <a:schemeClr val="accent1">
+              <a:shade val="50000"/>
+            </a:schemeClr>
+          </a:lnRef>
+          <a:fillRef idx="1">
+            <a:schemeClr val="accent1"/>
+          </a:fillRef>
+          <a:effectRef idx="0">
+            <a:schemeClr val="accent1"/>
+          </a:effectRef>
+          <a:fontRef idx="minor">
+            <a:schemeClr val="lt1"/>
+          </a:fontRef>
+        </p:style>
+        <p:txBody>
+          <a:bodyPr rtlCol="0" anchor="ctr"/>
+          <a:lstStyle/>
+          <a:p>
+            <a:pPr algn="ctr"/>
+            <a:endParaRPr lang="en-US">
+              <a:solidFill>
+                <a:srgbClr val="FF0000"/>
+              </a:solidFill>
+            </a:endParaRPr>
+          </a:p>
+        </p:txBody>
+      </p:sp>
+      <p:sp>
+        <p:nvSpPr>
+          <p:cNvPr id="201" name="Multiply 200"/>
+          <p:cNvSpPr>
+            <a:spLocks/>
+          </p:cNvSpPr>
+          <p:nvPr/>
+        </p:nvSpPr>
+        <p:spPr>
+          <a:xfrm>
+            <a:off x="6280149" y="3128727"/>
+            <a:ext cx="218180" cy="213898"/>
+          </a:xfrm>
+          <a:prstGeom prst="mathMultiply">
+            <a:avLst/>
+          </a:prstGeom>
+          <a:solidFill>
+            <a:srgbClr val="FF0000"/>
+          </a:solidFill>
+          <a:ln w="0">
+            <a:noFill/>
+          </a:ln>
+          <a:effectLst>
+            <a:reflection stA="45000" endPos="0" dist="50800" dir="5400000" sy="-100000" algn="bl" rotWithShape="0"/>
+          </a:effectLst>
+        </p:spPr>
+        <p:style>
+          <a:lnRef idx="2">
+            <a:schemeClr val="accent1">
+              <a:shade val="50000"/>
+            </a:schemeClr>
+          </a:lnRef>
+          <a:fillRef idx="1">
+            <a:schemeClr val="accent1"/>
+          </a:fillRef>
+          <a:effectRef idx="0">
+            <a:schemeClr val="accent1"/>
+          </a:effectRef>
+          <a:fontRef idx="minor">
+            <a:schemeClr val="lt1"/>
+          </a:fontRef>
+        </p:style>
+        <p:txBody>
+          <a:bodyPr rtlCol="0" anchor="ctr"/>
+          <a:lstStyle/>
+          <a:p>
+            <a:pPr algn="ctr"/>
+            <a:endParaRPr lang="en-US">
+              <a:solidFill>
+                <a:srgbClr val="FF0000"/>
+              </a:solidFill>
+            </a:endParaRPr>
+          </a:p>
+        </p:txBody>
+      </p:sp>
+      <p:sp>
+        <p:nvSpPr>
+          <p:cNvPr id="202" name="Multiply 201"/>
+          <p:cNvSpPr>
+            <a:spLocks/>
+          </p:cNvSpPr>
+          <p:nvPr/>
+        </p:nvSpPr>
+        <p:spPr>
+          <a:xfrm>
+            <a:off x="6888342" y="3131851"/>
+            <a:ext cx="218180" cy="213898"/>
+          </a:xfrm>
+          <a:prstGeom prst="mathMultiply">
+            <a:avLst/>
+          </a:prstGeom>
+          <a:solidFill>
+            <a:srgbClr val="FF0000"/>
+          </a:solidFill>
+          <a:ln w="0">
+            <a:noFill/>
+          </a:ln>
+          <a:effectLst>
+            <a:reflection stA="45000" endPos="0" dist="50800" dir="5400000" sy="-100000" algn="bl" rotWithShape="0"/>
+          </a:effectLst>
+        </p:spPr>
+        <p:style>
+          <a:lnRef idx="2">
+            <a:schemeClr val="accent1">
+              <a:shade val="50000"/>
+            </a:schemeClr>
+          </a:lnRef>
+          <a:fillRef idx="1">
+            <a:schemeClr val="accent1"/>
+          </a:fillRef>
+          <a:effectRef idx="0">
+            <a:schemeClr val="accent1"/>
+          </a:effectRef>
+          <a:fontRef idx="minor">
+            <a:schemeClr val="lt1"/>
+          </a:fontRef>
+        </p:style>
+        <p:txBody>
+          <a:bodyPr rtlCol="0" anchor="ctr"/>
+          <a:lstStyle/>
+          <a:p>
+            <a:pPr algn="ctr"/>
+            <a:endParaRPr lang="en-US">
+              <a:solidFill>
+                <a:srgbClr val="FF0000"/>
+              </a:solidFill>
+            </a:endParaRPr>
+          </a:p>
+        </p:txBody>
+      </p:sp>
+      <p:sp>
+        <p:nvSpPr>
+          <p:cNvPr id="203" name="Multiply 202"/>
+          <p:cNvSpPr>
+            <a:spLocks/>
+          </p:cNvSpPr>
+          <p:nvPr/>
+        </p:nvSpPr>
+        <p:spPr>
+          <a:xfrm>
+            <a:off x="2550351" y="3961816"/>
+            <a:ext cx="218180" cy="213898"/>
+          </a:xfrm>
+          <a:prstGeom prst="mathMultiply">
+            <a:avLst/>
+          </a:prstGeom>
+          <a:solidFill>
+            <a:srgbClr val="FF0000"/>
+          </a:solidFill>
+          <a:ln w="0">
+            <a:noFill/>
+          </a:ln>
+          <a:effectLst>
+            <a:reflection stA="45000" endPos="0" dist="50800" dir="5400000" sy="-100000" algn="bl" rotWithShape="0"/>
+          </a:effectLst>
+        </p:spPr>
+        <p:style>
+          <a:lnRef idx="2">
+            <a:schemeClr val="accent1">
+              <a:shade val="50000"/>
+            </a:schemeClr>
+          </a:lnRef>
+          <a:fillRef idx="1">
+            <a:schemeClr val="accent1"/>
+          </a:fillRef>
+          <a:effectRef idx="0">
+            <a:schemeClr val="accent1"/>
+          </a:effectRef>
+          <a:fontRef idx="minor">
+            <a:schemeClr val="lt1"/>
+          </a:fontRef>
+        </p:style>
+        <p:txBody>
+          <a:bodyPr rtlCol="0" anchor="ctr"/>
+          <a:lstStyle/>
+          <a:p>
+            <a:pPr algn="ctr"/>
+            <a:endParaRPr lang="en-US">
+              <a:solidFill>
+                <a:srgbClr val="FF0000"/>
+              </a:solidFill>
+            </a:endParaRPr>
+          </a:p>
+        </p:txBody>
+      </p:sp>
+      <p:sp>
+        <p:nvSpPr>
+          <p:cNvPr id="204" name="Multiply 203"/>
+          <p:cNvSpPr>
+            <a:spLocks/>
+          </p:cNvSpPr>
+          <p:nvPr/>
+        </p:nvSpPr>
+        <p:spPr>
+          <a:xfrm>
+            <a:off x="1889538" y="3971469"/>
+            <a:ext cx="218180" cy="213898"/>
+          </a:xfrm>
+          <a:prstGeom prst="mathMultiply">
+            <a:avLst/>
+          </a:prstGeom>
+          <a:solidFill>
+            <a:srgbClr val="FF0000"/>
+          </a:solidFill>
+          <a:ln w="0">
+            <a:noFill/>
+          </a:ln>
+          <a:effectLst>
+            <a:reflection stA="45000" endPos="0" dist="50800" dir="5400000" sy="-100000" algn="bl" rotWithShape="0"/>
+          </a:effectLst>
+        </p:spPr>
+        <p:style>
+          <a:lnRef idx="2">
+            <a:schemeClr val="accent1">
+              <a:shade val="50000"/>
+            </a:schemeClr>
+          </a:lnRef>
+          <a:fillRef idx="1">
+            <a:schemeClr val="accent1"/>
+          </a:fillRef>
+          <a:effectRef idx="0">
+            <a:schemeClr val="accent1"/>
+          </a:effectRef>
+          <a:fontRef idx="minor">
+            <a:schemeClr val="lt1"/>
+          </a:fontRef>
+        </p:style>
+        <p:txBody>
+          <a:bodyPr rtlCol="0" anchor="ctr"/>
+          <a:lstStyle/>
+          <a:p>
+            <a:pPr algn="ctr"/>
+            <a:endParaRPr lang="en-US">
+              <a:solidFill>
+                <a:srgbClr val="FF0000"/>
+              </a:solidFill>
+            </a:endParaRPr>
+          </a:p>
+        </p:txBody>
+      </p:sp>
+      <p:sp>
+        <p:nvSpPr>
+          <p:cNvPr id="205" name="Multiply 204"/>
+          <p:cNvSpPr>
+            <a:spLocks/>
+          </p:cNvSpPr>
+          <p:nvPr/>
+        </p:nvSpPr>
+        <p:spPr>
+          <a:xfrm>
+            <a:off x="3740816" y="3961756"/>
+            <a:ext cx="218180" cy="213898"/>
+          </a:xfrm>
+          <a:prstGeom prst="mathMultiply">
+            <a:avLst/>
+          </a:prstGeom>
+          <a:solidFill>
+            <a:srgbClr val="FF0000"/>
+          </a:solidFill>
+          <a:ln w="0">
+            <a:noFill/>
+          </a:ln>
+          <a:effectLst>
+            <a:reflection stA="45000" endPos="0" dist="50800" dir="5400000" sy="-100000" algn="bl" rotWithShape="0"/>
+          </a:effectLst>
+        </p:spPr>
+        <p:style>
+          <a:lnRef idx="2">
+            <a:schemeClr val="accent1">
+              <a:shade val="50000"/>
+            </a:schemeClr>
+          </a:lnRef>
+          <a:fillRef idx="1">
+            <a:schemeClr val="accent1"/>
+          </a:fillRef>
+          <a:effectRef idx="0">
+            <a:schemeClr val="accent1"/>
+          </a:effectRef>
+          <a:fontRef idx="minor">
+            <a:schemeClr val="lt1"/>
+          </a:fontRef>
+        </p:style>
+        <p:txBody>
+          <a:bodyPr rtlCol="0" anchor="ctr"/>
+          <a:lstStyle/>
+          <a:p>
+            <a:pPr algn="ctr"/>
+            <a:endParaRPr lang="en-US">
+              <a:solidFill>
+                <a:srgbClr val="FF0000"/>
+              </a:solidFill>
+            </a:endParaRPr>
+          </a:p>
+        </p:txBody>
+      </p:sp>
+      <p:sp>
+        <p:nvSpPr>
+          <p:cNvPr id="206" name="Multiply 205"/>
+          <p:cNvSpPr>
+            <a:spLocks/>
+          </p:cNvSpPr>
+          <p:nvPr/>
+        </p:nvSpPr>
+        <p:spPr>
+          <a:xfrm>
+            <a:off x="4334220" y="3971819"/>
+            <a:ext cx="218180" cy="213898"/>
+          </a:xfrm>
+          <a:prstGeom prst="mathMultiply">
+            <a:avLst/>
+          </a:prstGeom>
+          <a:solidFill>
+            <a:srgbClr val="FF0000"/>
+          </a:solidFill>
+          <a:ln w="0">
+            <a:noFill/>
+          </a:ln>
+          <a:effectLst>
+            <a:reflection stA="45000" endPos="0" dist="50800" dir="5400000" sy="-100000" algn="bl" rotWithShape="0"/>
+          </a:effectLst>
+        </p:spPr>
+        <p:style>
+          <a:lnRef idx="2">
+            <a:schemeClr val="accent1">
+              <a:shade val="50000"/>
+            </a:schemeClr>
+          </a:lnRef>
+          <a:fillRef idx="1">
+            <a:schemeClr val="accent1"/>
+          </a:fillRef>
+          <a:effectRef idx="0">
+            <a:schemeClr val="accent1"/>
+          </a:effectRef>
+          <a:fontRef idx="minor">
+            <a:schemeClr val="lt1"/>
+          </a:fontRef>
+        </p:style>
+        <p:txBody>
+          <a:bodyPr rtlCol="0" anchor="ctr"/>
+          <a:lstStyle/>
+          <a:p>
+            <a:pPr algn="ctr"/>
+            <a:endParaRPr lang="en-US">
+              <a:solidFill>
+                <a:srgbClr val="FF0000"/>
+              </a:solidFill>
+            </a:endParaRPr>
+          </a:p>
+        </p:txBody>
+      </p:sp>
+      <p:sp>
+        <p:nvSpPr>
+          <p:cNvPr id="207" name="Multiply 206"/>
+          <p:cNvSpPr>
+            <a:spLocks/>
+          </p:cNvSpPr>
+          <p:nvPr/>
+        </p:nvSpPr>
+        <p:spPr>
+          <a:xfrm>
+            <a:off x="4934739" y="3961756"/>
+            <a:ext cx="218180" cy="213898"/>
+          </a:xfrm>
+          <a:prstGeom prst="mathMultiply">
+            <a:avLst/>
+          </a:prstGeom>
+          <a:solidFill>
+            <a:srgbClr val="FF0000"/>
+          </a:solidFill>
+          <a:ln w="0">
+            <a:noFill/>
+          </a:ln>
+          <a:effectLst>
+            <a:reflection stA="45000" endPos="0" dist="50800" dir="5400000" sy="-100000" algn="bl" rotWithShape="0"/>
+          </a:effectLst>
+        </p:spPr>
+        <p:style>
+          <a:lnRef idx="2">
+            <a:schemeClr val="accent1">
+              <a:shade val="50000"/>
+            </a:schemeClr>
+          </a:lnRef>
+          <a:fillRef idx="1">
+            <a:schemeClr val="accent1"/>
+          </a:fillRef>
+          <a:effectRef idx="0">
+            <a:schemeClr val="accent1"/>
+          </a:effectRef>
+          <a:fontRef idx="minor">
+            <a:schemeClr val="lt1"/>
+          </a:fontRef>
+        </p:style>
+        <p:txBody>
+          <a:bodyPr rtlCol="0" anchor="ctr"/>
+          <a:lstStyle/>
+          <a:p>
+            <a:pPr algn="ctr"/>
+            <a:endParaRPr lang="en-US">
+              <a:solidFill>
+                <a:srgbClr val="FF0000"/>
+              </a:solidFill>
+            </a:endParaRPr>
+          </a:p>
+        </p:txBody>
+      </p:sp>
+      <p:sp>
+        <p:nvSpPr>
+          <p:cNvPr id="208" name="Multiply 207"/>
+          <p:cNvSpPr>
+            <a:spLocks/>
+          </p:cNvSpPr>
+          <p:nvPr/>
+        </p:nvSpPr>
+        <p:spPr>
+          <a:xfrm>
+            <a:off x="5542932" y="3964880"/>
+            <a:ext cx="218180" cy="213898"/>
+          </a:xfrm>
+          <a:prstGeom prst="mathMultiply">
+            <a:avLst/>
+          </a:prstGeom>
+          <a:solidFill>
+            <a:srgbClr val="FF0000"/>
+          </a:solidFill>
+          <a:ln w="0">
+            <a:noFill/>
+          </a:ln>
+          <a:effectLst>
+            <a:reflection stA="45000" endPos="0" dist="50800" dir="5400000" sy="-100000" algn="bl" rotWithShape="0"/>
+          </a:effectLst>
+        </p:spPr>
+        <p:style>
+          <a:lnRef idx="2">
+            <a:schemeClr val="accent1">
+              <a:shade val="50000"/>
+            </a:schemeClr>
+          </a:lnRef>
+          <a:fillRef idx="1">
+            <a:schemeClr val="accent1"/>
+          </a:fillRef>
+          <a:effectRef idx="0">
+            <a:schemeClr val="accent1"/>
+          </a:effectRef>
+          <a:fontRef idx="minor">
+            <a:schemeClr val="lt1"/>
+          </a:fontRef>
+        </p:style>
+        <p:txBody>
+          <a:bodyPr rtlCol="0" anchor="ctr"/>
+          <a:lstStyle/>
+          <a:p>
+            <a:pPr algn="ctr"/>
+            <a:endParaRPr lang="en-US">
+              <a:solidFill>
+                <a:srgbClr val="FF0000"/>
+              </a:solidFill>
+            </a:endParaRPr>
+          </a:p>
+        </p:txBody>
+      </p:sp>
+      <p:sp>
+        <p:nvSpPr>
+          <p:cNvPr id="209" name="Multiply 208"/>
+          <p:cNvSpPr>
+            <a:spLocks/>
+          </p:cNvSpPr>
+          <p:nvPr/>
+        </p:nvSpPr>
+        <p:spPr>
+          <a:xfrm>
+            <a:off x="2307325" y="4829320"/>
+            <a:ext cx="218180" cy="213898"/>
+          </a:xfrm>
+          <a:prstGeom prst="mathMultiply">
+            <a:avLst/>
+          </a:prstGeom>
+          <a:solidFill>
+            <a:srgbClr val="FF0000"/>
+          </a:solidFill>
+          <a:ln w="0">
+            <a:noFill/>
+          </a:ln>
+          <a:effectLst>
+            <a:reflection stA="45000" endPos="0" dist="50800" dir="5400000" sy="-100000" algn="bl" rotWithShape="0"/>
+          </a:effectLst>
+        </p:spPr>
+        <p:style>
+          <a:lnRef idx="2">
+            <a:schemeClr val="accent1">
+              <a:shade val="50000"/>
+            </a:schemeClr>
+          </a:lnRef>
+          <a:fillRef idx="1">
+            <a:schemeClr val="accent1"/>
+          </a:fillRef>
+          <a:effectRef idx="0">
+            <a:schemeClr val="accent1"/>
+          </a:effectRef>
+          <a:fontRef idx="minor">
+            <a:schemeClr val="lt1"/>
+          </a:fontRef>
+        </p:style>
+        <p:txBody>
+          <a:bodyPr rtlCol="0" anchor="ctr"/>
+          <a:lstStyle/>
+          <a:p>
+            <a:pPr algn="ctr"/>
+            <a:endParaRPr lang="en-US">
+              <a:solidFill>
+                <a:srgbClr val="FF0000"/>
+              </a:solidFill>
+            </a:endParaRPr>
+          </a:p>
+        </p:txBody>
+      </p:sp>
+      <p:sp>
+        <p:nvSpPr>
+          <p:cNvPr id="210" name="Multiply 209"/>
+          <p:cNvSpPr>
+            <a:spLocks/>
+          </p:cNvSpPr>
+          <p:nvPr/>
+        </p:nvSpPr>
+        <p:spPr>
+          <a:xfrm>
+            <a:off x="2947253" y="4812515"/>
+            <a:ext cx="218180" cy="213898"/>
+          </a:xfrm>
+          <a:prstGeom prst="mathMultiply">
+            <a:avLst/>
+          </a:prstGeom>
+          <a:solidFill>
+            <a:srgbClr val="FF0000"/>
+          </a:solidFill>
+          <a:ln w="0">
+            <a:noFill/>
+          </a:ln>
+          <a:effectLst>
+            <a:reflection stA="45000" endPos="0" dist="50800" dir="5400000" sy="-100000" algn="bl" rotWithShape="0"/>
+          </a:effectLst>
+        </p:spPr>
+        <p:style>
+          <a:lnRef idx="2">
+            <a:schemeClr val="accent1">
+              <a:shade val="50000"/>
+            </a:schemeClr>
+          </a:lnRef>
+          <a:fillRef idx="1">
+            <a:schemeClr val="accent1"/>
+          </a:fillRef>
+          <a:effectRef idx="0">
+            <a:schemeClr val="accent1"/>
+          </a:effectRef>
+          <a:fontRef idx="minor">
+            <a:schemeClr val="lt1"/>
+          </a:fontRef>
+        </p:style>
+        <p:txBody>
+          <a:bodyPr rtlCol="0" anchor="ctr"/>
+          <a:lstStyle/>
+          <a:p>
+            <a:pPr algn="ctr"/>
+            <a:endParaRPr lang="en-US">
+              <a:solidFill>
+                <a:srgbClr val="FF0000"/>
+              </a:solidFill>
+            </a:endParaRPr>
+          </a:p>
+        </p:txBody>
+      </p:sp>
+      <p:sp>
+        <p:nvSpPr>
+          <p:cNvPr id="213" name="Multiply 212"/>
+          <p:cNvSpPr>
+            <a:spLocks/>
+          </p:cNvSpPr>
+          <p:nvPr/>
+        </p:nvSpPr>
+        <p:spPr>
+          <a:xfrm>
+            <a:off x="3553041" y="4820555"/>
             <a:ext cx="218180" cy="213898"/>
           </a:xfrm>
           <a:prstGeom prst="mathMultiply">
@@ -13322,21 +15082,21 @@
                 <a:gridCol w="873044">
                   <a:extLst>
                     <a:ext uri="{9D8B030D-6E8A-4147-A177-3AD203B41FA5}">
-                      <a16:colId xmlns:a16="http://schemas.microsoft.com/office/drawing/2014/main" val="1842320837"/>
+                      <a16:colId xmlns:a16="http://schemas.microsoft.com/office/drawing/2014/main" xmlns="" val="1842320837"/>
                     </a:ext>
                   </a:extLst>
                 </a:gridCol>
                 <a:gridCol w="717388">
                   <a:extLst>
                     <a:ext uri="{9D8B030D-6E8A-4147-A177-3AD203B41FA5}">
-                      <a16:colId xmlns:a16="http://schemas.microsoft.com/office/drawing/2014/main" val="2038016994"/>
+                      <a16:colId xmlns:a16="http://schemas.microsoft.com/office/drawing/2014/main" xmlns="" val="2038016994"/>
                     </a:ext>
                   </a:extLst>
                 </a:gridCol>
                 <a:gridCol w="1028699">
                   <a:extLst>
                     <a:ext uri="{9D8B030D-6E8A-4147-A177-3AD203B41FA5}">
-                      <a16:colId xmlns:a16="http://schemas.microsoft.com/office/drawing/2014/main" val="3728435139"/>
+                      <a16:colId xmlns:a16="http://schemas.microsoft.com/office/drawing/2014/main" xmlns="" val="3728435139"/>
                     </a:ext>
                   </a:extLst>
                 </a:gridCol>
@@ -13389,7 +15149,7 @@
                 </a:tc>
                 <a:extLst>
                   <a:ext uri="{0D108BD9-81ED-4DB2-BD59-A6C34878D82A}">
-                    <a16:rowId xmlns:a16="http://schemas.microsoft.com/office/drawing/2014/main" val="1025974938"/>
+                    <a16:rowId xmlns:a16="http://schemas.microsoft.com/office/drawing/2014/main" xmlns="" val="1025974938"/>
                   </a:ext>
                 </a:extLst>
               </a:tr>
@@ -13441,7 +15201,7 @@
                 </a:tc>
                 <a:extLst>
                   <a:ext uri="{0D108BD9-81ED-4DB2-BD59-A6C34878D82A}">
-                    <a16:rowId xmlns:a16="http://schemas.microsoft.com/office/drawing/2014/main" val="4077566409"/>
+                    <a16:rowId xmlns:a16="http://schemas.microsoft.com/office/drawing/2014/main" xmlns="" val="4077566409"/>
                   </a:ext>
                 </a:extLst>
               </a:tr>
@@ -13493,7 +15253,7 @@
                 </a:tc>
                 <a:extLst>
                   <a:ext uri="{0D108BD9-81ED-4DB2-BD59-A6C34878D82A}">
-                    <a16:rowId xmlns:a16="http://schemas.microsoft.com/office/drawing/2014/main" val="4214053569"/>
+                    <a16:rowId xmlns:a16="http://schemas.microsoft.com/office/drawing/2014/main" xmlns="" val="4214053569"/>
                   </a:ext>
                 </a:extLst>
               </a:tr>
@@ -13545,7 +15305,7 @@
                 </a:tc>
                 <a:extLst>
                   <a:ext uri="{0D108BD9-81ED-4DB2-BD59-A6C34878D82A}">
-                    <a16:rowId xmlns:a16="http://schemas.microsoft.com/office/drawing/2014/main" val="3475086053"/>
+                    <a16:rowId xmlns:a16="http://schemas.microsoft.com/office/drawing/2014/main" xmlns="" val="3475086053"/>
                   </a:ext>
                 </a:extLst>
               </a:tr>
@@ -13597,7 +15357,7 @@
                 </a:tc>
                 <a:extLst>
                   <a:ext uri="{0D108BD9-81ED-4DB2-BD59-A6C34878D82A}">
-                    <a16:rowId xmlns:a16="http://schemas.microsoft.com/office/drawing/2014/main" val="3245955256"/>
+                    <a16:rowId xmlns:a16="http://schemas.microsoft.com/office/drawing/2014/main" xmlns="" val="3245955256"/>
                   </a:ext>
                 </a:extLst>
               </a:tr>
@@ -13649,7 +15409,7 @@
                 </a:tc>
                 <a:extLst>
                   <a:ext uri="{0D108BD9-81ED-4DB2-BD59-A6C34878D82A}">
-                    <a16:rowId xmlns:a16="http://schemas.microsoft.com/office/drawing/2014/main" val="1233959304"/>
+                    <a16:rowId xmlns:a16="http://schemas.microsoft.com/office/drawing/2014/main" xmlns="" val="1233959304"/>
                   </a:ext>
                 </a:extLst>
               </a:tr>

</xml_diff>